<commit_message>
updates rel alg slide
</commit_message>
<xml_diff>
--- a/Slides/Ders 3 İlişkisel Cebir.pptx
+++ b/Slides/Ders 3 İlişkisel Cebir.pptx
@@ -218,7 +218,7 @@
           <a:p>
             <a:fld id="{DD4244C5-5D67-C540-97C4-F007CFC432EF}" type="datetimeFigureOut">
               <a:rPr lang="tr-TR" smtClean="0"/>
-              <a:t>21.03.2023</a:t>
+              <a:t>2.03.2024</a:t>
             </a:fld>
             <a:endParaRPr lang="tr-TR"/>
           </a:p>
@@ -617,7 +617,7 @@
           <a:p>
             <a:fld id="{26396F4E-1D0B-3F44-AA0F-A3430AE5742F}" type="datetimeFigureOut">
               <a:rPr lang="tr-TR" smtClean="0"/>
-              <a:t>21.03.2023</a:t>
+              <a:t>2.03.2024</a:t>
             </a:fld>
             <a:endParaRPr lang="tr-TR"/>
           </a:p>
@@ -787,7 +787,7 @@
           <a:p>
             <a:fld id="{26396F4E-1D0B-3F44-AA0F-A3430AE5742F}" type="datetimeFigureOut">
               <a:rPr lang="tr-TR" smtClean="0"/>
-              <a:t>21.03.2023</a:t>
+              <a:t>2.03.2024</a:t>
             </a:fld>
             <a:endParaRPr lang="tr-TR"/>
           </a:p>
@@ -967,7 +967,7 @@
           <a:p>
             <a:fld id="{26396F4E-1D0B-3F44-AA0F-A3430AE5742F}" type="datetimeFigureOut">
               <a:rPr lang="tr-TR" smtClean="0"/>
-              <a:t>21.03.2023</a:t>
+              <a:t>2.03.2024</a:t>
             </a:fld>
             <a:endParaRPr lang="tr-TR"/>
           </a:p>
@@ -1137,7 +1137,7 @@
           <a:p>
             <a:fld id="{26396F4E-1D0B-3F44-AA0F-A3430AE5742F}" type="datetimeFigureOut">
               <a:rPr lang="tr-TR" smtClean="0"/>
-              <a:t>21.03.2023</a:t>
+              <a:t>2.03.2024</a:t>
             </a:fld>
             <a:endParaRPr lang="tr-TR"/>
           </a:p>
@@ -1381,7 +1381,7 @@
           <a:p>
             <a:fld id="{26396F4E-1D0B-3F44-AA0F-A3430AE5742F}" type="datetimeFigureOut">
               <a:rPr lang="tr-TR" smtClean="0"/>
-              <a:t>21.03.2023</a:t>
+              <a:t>2.03.2024</a:t>
             </a:fld>
             <a:endParaRPr lang="tr-TR"/>
           </a:p>
@@ -1613,7 +1613,7 @@
           <a:p>
             <a:fld id="{26396F4E-1D0B-3F44-AA0F-A3430AE5742F}" type="datetimeFigureOut">
               <a:rPr lang="tr-TR" smtClean="0"/>
-              <a:t>21.03.2023</a:t>
+              <a:t>2.03.2024</a:t>
             </a:fld>
             <a:endParaRPr lang="tr-TR"/>
           </a:p>
@@ -1980,7 +1980,7 @@
           <a:p>
             <a:fld id="{26396F4E-1D0B-3F44-AA0F-A3430AE5742F}" type="datetimeFigureOut">
               <a:rPr lang="tr-TR" smtClean="0"/>
-              <a:t>21.03.2023</a:t>
+              <a:t>2.03.2024</a:t>
             </a:fld>
             <a:endParaRPr lang="tr-TR"/>
           </a:p>
@@ -2098,7 +2098,7 @@
           <a:p>
             <a:fld id="{26396F4E-1D0B-3F44-AA0F-A3430AE5742F}" type="datetimeFigureOut">
               <a:rPr lang="tr-TR" smtClean="0"/>
-              <a:t>21.03.2023</a:t>
+              <a:t>2.03.2024</a:t>
             </a:fld>
             <a:endParaRPr lang="tr-TR"/>
           </a:p>
@@ -2193,7 +2193,7 @@
           <a:p>
             <a:fld id="{26396F4E-1D0B-3F44-AA0F-A3430AE5742F}" type="datetimeFigureOut">
               <a:rPr lang="tr-TR" smtClean="0"/>
-              <a:t>21.03.2023</a:t>
+              <a:t>2.03.2024</a:t>
             </a:fld>
             <a:endParaRPr lang="tr-TR"/>
           </a:p>
@@ -2470,7 +2470,7 @@
           <a:p>
             <a:fld id="{26396F4E-1D0B-3F44-AA0F-A3430AE5742F}" type="datetimeFigureOut">
               <a:rPr lang="tr-TR" smtClean="0"/>
-              <a:t>21.03.2023</a:t>
+              <a:t>2.03.2024</a:t>
             </a:fld>
             <a:endParaRPr lang="tr-TR"/>
           </a:p>
@@ -2727,7 +2727,7 @@
           <a:p>
             <a:fld id="{26396F4E-1D0B-3F44-AA0F-A3430AE5742F}" type="datetimeFigureOut">
               <a:rPr lang="tr-TR" smtClean="0"/>
-              <a:t>21.03.2023</a:t>
+              <a:t>2.03.2024</a:t>
             </a:fld>
             <a:endParaRPr lang="tr-TR"/>
           </a:p>
@@ -2940,7 +2940,7 @@
           <a:p>
             <a:fld id="{26396F4E-1D0B-3F44-AA0F-A3430AE5742F}" type="datetimeFigureOut">
               <a:rPr lang="tr-TR" smtClean="0"/>
-              <a:t>21.03.2023</a:t>
+              <a:t>2.03.2024</a:t>
             </a:fld>
             <a:endParaRPr lang="tr-TR"/>
           </a:p>
@@ -3529,8 +3529,13 @@
           <a:p>
             <a:r>
               <a:rPr lang="tr-TR" dirty="0"/>
-              <a:t>Oda: 329</a:t>
-            </a:r>
+              <a:t>Oda</a:t>
+            </a:r>
+            <a:r>
+              <a:rPr lang="tr-TR"/>
+              <a:t>: 335</a:t>
+            </a:r>
+            <a:endParaRPr lang="tr-TR" dirty="0"/>
           </a:p>
         </p:txBody>
       </p:sp>

</xml_diff>